<commit_message>
real time function add
</commit_message>
<xml_diff>
--- a/contents/Render.pptx
+++ b/contents/Render.pptx
@@ -6,10 +6,10 @@
     <p:sldMasterId id="2147483672" r:id="rId2"/>
   </p:sldMasterIdLst>
   <p:notesMasterIdLst>
-    <p:notesMasterId r:id="rId14"/>
+    <p:notesMasterId r:id="rId15"/>
   </p:notesMasterIdLst>
   <p:handoutMasterIdLst>
-    <p:handoutMasterId r:id="rId15"/>
+    <p:handoutMasterId r:id="rId16"/>
   </p:handoutMasterIdLst>
   <p:sldIdLst>
     <p:sldId id="261" r:id="rId3"/>
@@ -22,7 +22,8 @@
     <p:sldId id="487" r:id="rId10"/>
     <p:sldId id="488" r:id="rId11"/>
     <p:sldId id="489" r:id="rId12"/>
-    <p:sldId id="421" r:id="rId13"/>
+    <p:sldId id="490" r:id="rId13"/>
+    <p:sldId id="421" r:id="rId14"/>
   </p:sldIdLst>
   <p:sldSz cx="9144000" cy="6858000" type="screen4x3"/>
   <p:notesSz cx="6735763" cy="9866313"/>
@@ -124,7 +125,7 @@
   <p:extLst>
     <p:ext uri="{EFAFB233-063F-42B5-8137-9DF3F51BA10A}">
       <p15:sldGuideLst xmlns:p15="http://schemas.microsoft.com/office/powerpoint/2012/main">
-        <p15:guide id="1" orient="horz" pos="2183" userDrawn="1">
+        <p15:guide id="1" orient="horz" pos="2205" userDrawn="1">
           <p15:clr>
             <a:srgbClr val="A4A3A4"/>
           </p15:clr>
@@ -6943,6 +6944,478 @@
           <a:chExt cx="0" cy="0"/>
         </a:xfrm>
       </p:grpSpPr>
+      <p:pic>
+        <p:nvPicPr>
+          <p:cNvPr id="2" name="그림 1"/>
+          <p:cNvPicPr>
+            <a:picLocks noChangeAspect="1"/>
+          </p:cNvPicPr>
+          <p:nvPr/>
+        </p:nvPicPr>
+        <p:blipFill>
+          <a:blip r:embed="rId2"/>
+          <a:stretch>
+            <a:fillRect/>
+          </a:stretch>
+        </p:blipFill>
+        <p:spPr>
+          <a:xfrm>
+            <a:off x="250825" y="1341438"/>
+            <a:ext cx="2900241" cy="5148262"/>
+          </a:xfrm>
+          <a:prstGeom prst="rect">
+            <a:avLst/>
+          </a:prstGeom>
+        </p:spPr>
+      </p:pic>
+      <p:sp>
+        <p:nvSpPr>
+          <p:cNvPr id="3" name="직사각형 2"/>
+          <p:cNvSpPr/>
+          <p:nvPr/>
+        </p:nvSpPr>
+        <p:spPr>
+          <a:xfrm>
+            <a:off x="3991969" y="1538382"/>
+            <a:ext cx="1419367" cy="396685"/>
+          </a:xfrm>
+          <a:prstGeom prst="rect">
+            <a:avLst/>
+          </a:prstGeom>
+          <a:noFill/>
+          <a:ln w="28575">
+            <a:solidFill>
+              <a:schemeClr val="tx2">
+                <a:lumMod val="60000"/>
+                <a:lumOff val="40000"/>
+              </a:schemeClr>
+            </a:solidFill>
+          </a:ln>
+        </p:spPr>
+        <p:style>
+          <a:lnRef idx="2">
+            <a:schemeClr val="accent1">
+              <a:shade val="50000"/>
+            </a:schemeClr>
+          </a:lnRef>
+          <a:fillRef idx="1">
+            <a:schemeClr val="accent1"/>
+          </a:fillRef>
+          <a:effectRef idx="0">
+            <a:schemeClr val="accent1"/>
+          </a:effectRef>
+          <a:fontRef idx="minor">
+            <a:schemeClr val="lt1"/>
+          </a:fontRef>
+        </p:style>
+        <p:txBody>
+          <a:bodyPr rtlCol="0" anchor="ctr"/>
+          <a:lstStyle/>
+          <a:p>
+            <a:pPr algn="ctr"/>
+            <a:r>
+              <a:rPr lang="ko-KR" altLang="en-US" sz="1200">
+                <a:solidFill>
+                  <a:schemeClr val="tx1"/>
+                </a:solidFill>
+                <a:latin typeface="+mn-ea"/>
+              </a:rPr>
+              <a:t>웹</a:t>
+            </a:r>
+            <a:r>
+              <a:rPr lang="ko-KR" altLang="en-US" sz="1200" smtClean="0">
+                <a:solidFill>
+                  <a:schemeClr val="tx1"/>
+                </a:solidFill>
+                <a:latin typeface="+mn-ea"/>
+              </a:rPr>
+              <a:t>브라우저</a:t>
+            </a:r>
+            <a:endParaRPr lang="ko-KR" altLang="en-US" sz="1200">
+              <a:solidFill>
+                <a:schemeClr val="tx1"/>
+              </a:solidFill>
+              <a:latin typeface="+mn-ea"/>
+            </a:endParaRPr>
+          </a:p>
+        </p:txBody>
+      </p:sp>
+      <p:cxnSp>
+        <p:nvCxnSpPr>
+          <p:cNvPr id="5" name="직선 화살표 연결선 4"/>
+          <p:cNvCxnSpPr>
+            <a:stCxn id="3" idx="2"/>
+            <a:endCxn id="6" idx="0"/>
+          </p:cNvCxnSpPr>
+          <p:nvPr/>
+        </p:nvCxnSpPr>
+        <p:spPr>
+          <a:xfrm>
+            <a:off x="4701653" y="1935067"/>
+            <a:ext cx="0" cy="255399"/>
+          </a:xfrm>
+          <a:prstGeom prst="straightConnector1">
+            <a:avLst/>
+          </a:prstGeom>
+          <a:ln w="19050">
+            <a:solidFill>
+              <a:schemeClr val="tx2">
+                <a:lumMod val="75000"/>
+              </a:schemeClr>
+            </a:solidFill>
+            <a:prstDash val="solid"/>
+            <a:tailEnd type="triangle"/>
+          </a:ln>
+        </p:spPr>
+        <p:style>
+          <a:lnRef idx="1">
+            <a:schemeClr val="accent1"/>
+          </a:lnRef>
+          <a:fillRef idx="0">
+            <a:schemeClr val="accent1"/>
+          </a:fillRef>
+          <a:effectRef idx="0">
+            <a:schemeClr val="accent1"/>
+          </a:effectRef>
+          <a:fontRef idx="minor">
+            <a:schemeClr val="tx1"/>
+          </a:fontRef>
+        </p:style>
+      </p:cxnSp>
+      <p:sp>
+        <p:nvSpPr>
+          <p:cNvPr id="6" name="직사각형 5"/>
+          <p:cNvSpPr/>
+          <p:nvPr/>
+        </p:nvSpPr>
+        <p:spPr>
+          <a:xfrm>
+            <a:off x="3991969" y="2190466"/>
+            <a:ext cx="1419367" cy="396685"/>
+          </a:xfrm>
+          <a:prstGeom prst="rect">
+            <a:avLst/>
+          </a:prstGeom>
+          <a:noFill/>
+          <a:ln w="28575">
+            <a:solidFill>
+              <a:schemeClr val="tx2">
+                <a:lumMod val="60000"/>
+                <a:lumOff val="40000"/>
+              </a:schemeClr>
+            </a:solidFill>
+          </a:ln>
+        </p:spPr>
+        <p:style>
+          <a:lnRef idx="2">
+            <a:schemeClr val="accent1">
+              <a:shade val="50000"/>
+            </a:schemeClr>
+          </a:lnRef>
+          <a:fillRef idx="1">
+            <a:schemeClr val="accent1"/>
+          </a:fillRef>
+          <a:effectRef idx="0">
+            <a:schemeClr val="accent1"/>
+          </a:effectRef>
+          <a:fontRef idx="minor">
+            <a:schemeClr val="lt1"/>
+          </a:fontRef>
+        </p:style>
+        <p:txBody>
+          <a:bodyPr rtlCol="0" anchor="ctr"/>
+          <a:lstStyle/>
+          <a:p>
+            <a:pPr algn="ctr"/>
+            <a:r>
+              <a:rPr lang="en-US" altLang="ko-KR" sz="1200" smtClean="0">
+                <a:solidFill>
+                  <a:schemeClr val="tx1"/>
+                </a:solidFill>
+                <a:latin typeface="+mn-ea"/>
+              </a:rPr>
+              <a:t>Uvicorn</a:t>
+            </a:r>
+            <a:endParaRPr lang="ko-KR" altLang="en-US" sz="1200">
+              <a:solidFill>
+                <a:schemeClr val="tx1"/>
+              </a:solidFill>
+              <a:latin typeface="+mn-ea"/>
+            </a:endParaRPr>
+          </a:p>
+        </p:txBody>
+      </p:sp>
+      <p:cxnSp>
+        <p:nvCxnSpPr>
+          <p:cNvPr id="7" name="직선 화살표 연결선 6"/>
+          <p:cNvCxnSpPr>
+            <a:stCxn id="6" idx="2"/>
+            <a:endCxn id="8" idx="0"/>
+          </p:cNvCxnSpPr>
+          <p:nvPr/>
+        </p:nvCxnSpPr>
+        <p:spPr>
+          <a:xfrm>
+            <a:off x="4701653" y="2587151"/>
+            <a:ext cx="0" cy="255399"/>
+          </a:xfrm>
+          <a:prstGeom prst="straightConnector1">
+            <a:avLst/>
+          </a:prstGeom>
+          <a:ln w="19050">
+            <a:solidFill>
+              <a:schemeClr val="tx2">
+                <a:lumMod val="75000"/>
+              </a:schemeClr>
+            </a:solidFill>
+            <a:prstDash val="solid"/>
+            <a:tailEnd type="triangle"/>
+          </a:ln>
+        </p:spPr>
+        <p:style>
+          <a:lnRef idx="1">
+            <a:schemeClr val="accent1"/>
+          </a:lnRef>
+          <a:fillRef idx="0">
+            <a:schemeClr val="accent1"/>
+          </a:fillRef>
+          <a:effectRef idx="0">
+            <a:schemeClr val="accent1"/>
+          </a:effectRef>
+          <a:fontRef idx="minor">
+            <a:schemeClr val="tx1"/>
+          </a:fontRef>
+        </p:style>
+      </p:cxnSp>
+      <p:sp>
+        <p:nvSpPr>
+          <p:cNvPr id="8" name="직사각형 7"/>
+          <p:cNvSpPr/>
+          <p:nvPr/>
+        </p:nvSpPr>
+        <p:spPr>
+          <a:xfrm>
+            <a:off x="3991969" y="2842550"/>
+            <a:ext cx="1419367" cy="396685"/>
+          </a:xfrm>
+          <a:prstGeom prst="rect">
+            <a:avLst/>
+          </a:prstGeom>
+          <a:noFill/>
+          <a:ln w="28575">
+            <a:solidFill>
+              <a:schemeClr val="tx2">
+                <a:lumMod val="60000"/>
+                <a:lumOff val="40000"/>
+              </a:schemeClr>
+            </a:solidFill>
+          </a:ln>
+        </p:spPr>
+        <p:style>
+          <a:lnRef idx="2">
+            <a:schemeClr val="accent1">
+              <a:shade val="50000"/>
+            </a:schemeClr>
+          </a:lnRef>
+          <a:fillRef idx="1">
+            <a:schemeClr val="accent1"/>
+          </a:fillRef>
+          <a:effectRef idx="0">
+            <a:schemeClr val="accent1"/>
+          </a:effectRef>
+          <a:fontRef idx="minor">
+            <a:schemeClr val="lt1"/>
+          </a:fontRef>
+        </p:style>
+        <p:txBody>
+          <a:bodyPr rtlCol="0" anchor="ctr"/>
+          <a:lstStyle/>
+          <a:p>
+            <a:pPr algn="ctr"/>
+            <a:r>
+              <a:rPr lang="en-US" altLang="ko-KR" sz="1200" smtClean="0">
+                <a:solidFill>
+                  <a:schemeClr val="tx1"/>
+                </a:solidFill>
+                <a:latin typeface="+mn-ea"/>
+              </a:rPr>
+              <a:t>FastAPI</a:t>
+            </a:r>
+            <a:endParaRPr lang="ko-KR" altLang="en-US" sz="1200">
+              <a:solidFill>
+                <a:schemeClr val="tx1"/>
+              </a:solidFill>
+              <a:latin typeface="+mn-ea"/>
+            </a:endParaRPr>
+          </a:p>
+        </p:txBody>
+      </p:sp>
+      <p:sp>
+        <p:nvSpPr>
+          <p:cNvPr id="9" name="직사각형 8"/>
+          <p:cNvSpPr/>
+          <p:nvPr/>
+        </p:nvSpPr>
+        <p:spPr>
+          <a:xfrm>
+            <a:off x="3991969" y="3494634"/>
+            <a:ext cx="1419367" cy="396685"/>
+          </a:xfrm>
+          <a:prstGeom prst="rect">
+            <a:avLst/>
+          </a:prstGeom>
+          <a:noFill/>
+          <a:ln w="28575">
+            <a:solidFill>
+              <a:schemeClr val="tx2">
+                <a:lumMod val="60000"/>
+                <a:lumOff val="40000"/>
+              </a:schemeClr>
+            </a:solidFill>
+          </a:ln>
+        </p:spPr>
+        <p:style>
+          <a:lnRef idx="2">
+            <a:schemeClr val="accent1">
+              <a:shade val="50000"/>
+            </a:schemeClr>
+          </a:lnRef>
+          <a:fillRef idx="1">
+            <a:schemeClr val="accent1"/>
+          </a:fillRef>
+          <a:effectRef idx="0">
+            <a:schemeClr val="accent1"/>
+          </a:effectRef>
+          <a:fontRef idx="minor">
+            <a:schemeClr val="lt1"/>
+          </a:fontRef>
+        </p:style>
+        <p:txBody>
+          <a:bodyPr rtlCol="0" anchor="ctr"/>
+          <a:lstStyle/>
+          <a:p>
+            <a:pPr algn="ctr"/>
+            <a:r>
+              <a:rPr lang="ko-KR" altLang="en-US" sz="1200" smtClean="0">
+                <a:solidFill>
+                  <a:schemeClr val="tx1"/>
+                </a:solidFill>
+                <a:latin typeface="+mn-ea"/>
+              </a:rPr>
+              <a:t>서비스 프로그램</a:t>
+            </a:r>
+            <a:endParaRPr lang="ko-KR" altLang="en-US" sz="1200">
+              <a:solidFill>
+                <a:schemeClr val="tx1"/>
+              </a:solidFill>
+              <a:latin typeface="+mn-ea"/>
+            </a:endParaRPr>
+          </a:p>
+        </p:txBody>
+      </p:sp>
+      <p:cxnSp>
+        <p:nvCxnSpPr>
+          <p:cNvPr id="13" name="직선 화살표 연결선 12"/>
+          <p:cNvCxnSpPr>
+            <a:stCxn id="8" idx="2"/>
+            <a:endCxn id="9" idx="0"/>
+          </p:cNvCxnSpPr>
+          <p:nvPr/>
+        </p:nvCxnSpPr>
+        <p:spPr>
+          <a:xfrm>
+            <a:off x="4701653" y="3239235"/>
+            <a:ext cx="0" cy="255399"/>
+          </a:xfrm>
+          <a:prstGeom prst="straightConnector1">
+            <a:avLst/>
+          </a:prstGeom>
+          <a:ln w="19050">
+            <a:solidFill>
+              <a:schemeClr val="tx2">
+                <a:lumMod val="75000"/>
+              </a:schemeClr>
+            </a:solidFill>
+            <a:prstDash val="solid"/>
+            <a:tailEnd type="triangle"/>
+          </a:ln>
+        </p:spPr>
+        <p:style>
+          <a:lnRef idx="1">
+            <a:schemeClr val="accent1"/>
+          </a:lnRef>
+          <a:fillRef idx="0">
+            <a:schemeClr val="accent1"/>
+          </a:fillRef>
+          <a:effectRef idx="0">
+            <a:schemeClr val="accent1"/>
+          </a:effectRef>
+          <a:fontRef idx="minor">
+            <a:schemeClr val="tx1"/>
+          </a:fontRef>
+        </p:style>
+      </p:cxnSp>
+      <p:pic>
+        <p:nvPicPr>
+          <p:cNvPr id="20" name="그림 19"/>
+          <p:cNvPicPr>
+            <a:picLocks noChangeAspect="1"/>
+          </p:cNvPicPr>
+          <p:nvPr/>
+        </p:nvPicPr>
+        <p:blipFill>
+          <a:blip r:embed="rId3"/>
+          <a:stretch>
+            <a:fillRect/>
+          </a:stretch>
+        </p:blipFill>
+        <p:spPr>
+          <a:xfrm>
+            <a:off x="5911720" y="1285868"/>
+            <a:ext cx="2534004" cy="5210902"/>
+          </a:xfrm>
+          <a:prstGeom prst="rect">
+            <a:avLst/>
+          </a:prstGeom>
+        </p:spPr>
+      </p:pic>
+    </p:spTree>
+    <p:extLst>
+      <p:ext uri="{BB962C8B-B14F-4D97-AF65-F5344CB8AC3E}">
+        <p14:creationId xmlns:p14="http://schemas.microsoft.com/office/powerpoint/2010/main" val="3054500680"/>
+      </p:ext>
+    </p:extLst>
+  </p:cSld>
+  <p:clrMapOvr>
+    <a:masterClrMapping/>
+  </p:clrMapOvr>
+  <p:timing>
+    <p:tnLst>
+      <p:par>
+        <p:cTn id="1" dur="indefinite" restart="never" nodeType="tmRoot"/>
+      </p:par>
+    </p:tnLst>
+  </p:timing>
+</p:sld>
+</file>
+
+<file path=ppt/slides/slide12.xml><?xml version="1.0" encoding="utf-8"?>
+<p:sld xmlns:a="http://schemas.openxmlformats.org/drawingml/2006/main" xmlns:r="http://schemas.openxmlformats.org/officeDocument/2006/relationships" xmlns:p="http://schemas.openxmlformats.org/presentationml/2006/main">
+  <p:cSld>
+    <p:spTree>
+      <p:nvGrpSpPr>
+        <p:cNvPr id="1" name=""/>
+        <p:cNvGrpSpPr/>
+        <p:nvPr/>
+      </p:nvGrpSpPr>
+      <p:grpSpPr>
+        <a:xfrm>
+          <a:off x="0" y="0"/>
+          <a:ext cx="0" cy="0"/>
+          <a:chOff x="0" y="0"/>
+          <a:chExt cx="0" cy="0"/>
+        </a:xfrm>
+      </p:grpSpPr>
       <p:sp>
         <p:nvSpPr>
           <p:cNvPr id="10" name="직사각형 9"/>
@@ -7040,6 +7513,13 @@
   <p:clrMapOvr>
     <a:masterClrMapping/>
   </p:clrMapOvr>
+  <p:timing>
+    <p:tnLst>
+      <p:par>
+        <p:cTn id="1" dur="indefinite" restart="never" nodeType="tmRoot"/>
+      </p:par>
+    </p:tnLst>
+  </p:timing>
 </p:sld>
 </file>
 
@@ -7622,7 +8102,7 @@
         </p:blipFill>
         <p:spPr>
           <a:xfrm>
-            <a:off x="250825" y="1341438"/>
+            <a:off x="244001" y="1341438"/>
             <a:ext cx="3600953" cy="2896004"/>
           </a:xfrm>
           <a:prstGeom prst="rect">

</xml_diff>